<commit_message>
Adição do pdf da apresentação
</commit_message>
<xml_diff>
--- a/PPS_ProjetoSaci_2.pptx
+++ b/PPS_ProjetoSaci_2.pptx
@@ -296,7 +296,7 @@
             <a:fld id="{0670EBBD-4B13-4AD7-AFB5-92105DCF1B3C}" type="datetimeFigureOut">
               <a:rPr lang="pt-BR" smtClean="0"/>
               <a:pPr/>
-              <a:t>22/07/2014</a:t>
+              <a:t>23/07/2014</a:t>
             </a:fld>
             <a:endParaRPr lang="pt-BR"/>
           </a:p>
@@ -339,7 +339,7 @@
             <a:fld id="{A860C3A5-2856-48FF-86AF-DABF9B624B89}" type="slidenum">
               <a:rPr lang="pt-BR" smtClean="0"/>
               <a:pPr/>
-              <a:t>‹#›</a:t>
+              <a:t>‹nº›</a:t>
             </a:fld>
             <a:endParaRPr lang="pt-BR"/>
           </a:p>
@@ -463,7 +463,7 @@
             <a:fld id="{0670EBBD-4B13-4AD7-AFB5-92105DCF1B3C}" type="datetimeFigureOut">
               <a:rPr lang="pt-BR" smtClean="0"/>
               <a:pPr/>
-              <a:t>22/07/2014</a:t>
+              <a:t>23/07/2014</a:t>
             </a:fld>
             <a:endParaRPr lang="pt-BR"/>
           </a:p>
@@ -506,7 +506,7 @@
             <a:fld id="{A860C3A5-2856-48FF-86AF-DABF9B624B89}" type="slidenum">
               <a:rPr lang="pt-BR" smtClean="0"/>
               <a:pPr/>
-              <a:t>‹#›</a:t>
+              <a:t>‹nº›</a:t>
             </a:fld>
             <a:endParaRPr lang="pt-BR"/>
           </a:p>
@@ -640,7 +640,7 @@
             <a:fld id="{0670EBBD-4B13-4AD7-AFB5-92105DCF1B3C}" type="datetimeFigureOut">
               <a:rPr lang="pt-BR" smtClean="0"/>
               <a:pPr/>
-              <a:t>22/07/2014</a:t>
+              <a:t>23/07/2014</a:t>
             </a:fld>
             <a:endParaRPr lang="pt-BR"/>
           </a:p>
@@ -683,7 +683,7 @@
             <a:fld id="{A860C3A5-2856-48FF-86AF-DABF9B624B89}" type="slidenum">
               <a:rPr lang="pt-BR" smtClean="0"/>
               <a:pPr/>
-              <a:t>‹#›</a:t>
+              <a:t>‹nº›</a:t>
             </a:fld>
             <a:endParaRPr lang="pt-BR"/>
           </a:p>
@@ -807,7 +807,7 @@
             <a:fld id="{0670EBBD-4B13-4AD7-AFB5-92105DCF1B3C}" type="datetimeFigureOut">
               <a:rPr lang="pt-BR" smtClean="0"/>
               <a:pPr/>
-              <a:t>22/07/2014</a:t>
+              <a:t>23/07/2014</a:t>
             </a:fld>
             <a:endParaRPr lang="pt-BR"/>
           </a:p>
@@ -850,7 +850,7 @@
             <a:fld id="{A860C3A5-2856-48FF-86AF-DABF9B624B89}" type="slidenum">
               <a:rPr lang="pt-BR" smtClean="0"/>
               <a:pPr/>
-              <a:t>‹#›</a:t>
+              <a:t>‹nº›</a:t>
             </a:fld>
             <a:endParaRPr lang="pt-BR"/>
           </a:p>
@@ -1050,7 +1050,7 @@
             <a:fld id="{0670EBBD-4B13-4AD7-AFB5-92105DCF1B3C}" type="datetimeFigureOut">
               <a:rPr lang="pt-BR" smtClean="0"/>
               <a:pPr/>
-              <a:t>22/07/2014</a:t>
+              <a:t>23/07/2014</a:t>
             </a:fld>
             <a:endParaRPr lang="pt-BR"/>
           </a:p>
@@ -1093,7 +1093,7 @@
             <a:fld id="{A860C3A5-2856-48FF-86AF-DABF9B624B89}" type="slidenum">
               <a:rPr lang="pt-BR" smtClean="0"/>
               <a:pPr/>
-              <a:t>‹#›</a:t>
+              <a:t>‹nº›</a:t>
             </a:fld>
             <a:endParaRPr lang="pt-BR"/>
           </a:p>
@@ -1335,7 +1335,7 @@
             <a:fld id="{0670EBBD-4B13-4AD7-AFB5-92105DCF1B3C}" type="datetimeFigureOut">
               <a:rPr lang="pt-BR" smtClean="0"/>
               <a:pPr/>
-              <a:t>22/07/2014</a:t>
+              <a:t>23/07/2014</a:t>
             </a:fld>
             <a:endParaRPr lang="pt-BR"/>
           </a:p>
@@ -1378,7 +1378,7 @@
             <a:fld id="{A860C3A5-2856-48FF-86AF-DABF9B624B89}" type="slidenum">
               <a:rPr lang="pt-BR" smtClean="0"/>
               <a:pPr/>
-              <a:t>‹#›</a:t>
+              <a:t>‹nº›</a:t>
             </a:fld>
             <a:endParaRPr lang="pt-BR"/>
           </a:p>
@@ -1754,7 +1754,7 @@
             <a:fld id="{0670EBBD-4B13-4AD7-AFB5-92105DCF1B3C}" type="datetimeFigureOut">
               <a:rPr lang="pt-BR" smtClean="0"/>
               <a:pPr/>
-              <a:t>22/07/2014</a:t>
+              <a:t>23/07/2014</a:t>
             </a:fld>
             <a:endParaRPr lang="pt-BR"/>
           </a:p>
@@ -1797,7 +1797,7 @@
             <a:fld id="{A860C3A5-2856-48FF-86AF-DABF9B624B89}" type="slidenum">
               <a:rPr lang="pt-BR" smtClean="0"/>
               <a:pPr/>
-              <a:t>‹#›</a:t>
+              <a:t>‹nº›</a:t>
             </a:fld>
             <a:endParaRPr lang="pt-BR"/>
           </a:p>
@@ -1869,7 +1869,7 @@
             <a:fld id="{0670EBBD-4B13-4AD7-AFB5-92105DCF1B3C}" type="datetimeFigureOut">
               <a:rPr lang="pt-BR" smtClean="0"/>
               <a:pPr/>
-              <a:t>22/07/2014</a:t>
+              <a:t>23/07/2014</a:t>
             </a:fld>
             <a:endParaRPr lang="pt-BR"/>
           </a:p>
@@ -1912,7 +1912,7 @@
             <a:fld id="{A860C3A5-2856-48FF-86AF-DABF9B624B89}" type="slidenum">
               <a:rPr lang="pt-BR" smtClean="0"/>
               <a:pPr/>
-              <a:t>‹#›</a:t>
+              <a:t>‹nº›</a:t>
             </a:fld>
             <a:endParaRPr lang="pt-BR"/>
           </a:p>
@@ -1961,7 +1961,7 @@
             <a:fld id="{0670EBBD-4B13-4AD7-AFB5-92105DCF1B3C}" type="datetimeFigureOut">
               <a:rPr lang="pt-BR" smtClean="0"/>
               <a:pPr/>
-              <a:t>22/07/2014</a:t>
+              <a:t>23/07/2014</a:t>
             </a:fld>
             <a:endParaRPr lang="pt-BR"/>
           </a:p>
@@ -2004,7 +2004,7 @@
             <a:fld id="{A860C3A5-2856-48FF-86AF-DABF9B624B89}" type="slidenum">
               <a:rPr lang="pt-BR" smtClean="0"/>
               <a:pPr/>
-              <a:t>‹#›</a:t>
+              <a:t>‹nº›</a:t>
             </a:fld>
             <a:endParaRPr lang="pt-BR"/>
           </a:p>
@@ -2235,7 +2235,7 @@
             <a:fld id="{0670EBBD-4B13-4AD7-AFB5-92105DCF1B3C}" type="datetimeFigureOut">
               <a:rPr lang="pt-BR" smtClean="0"/>
               <a:pPr/>
-              <a:t>22/07/2014</a:t>
+              <a:t>23/07/2014</a:t>
             </a:fld>
             <a:endParaRPr lang="pt-BR"/>
           </a:p>
@@ -2278,7 +2278,7 @@
             <a:fld id="{A860C3A5-2856-48FF-86AF-DABF9B624B89}" type="slidenum">
               <a:rPr lang="pt-BR" smtClean="0"/>
               <a:pPr/>
-              <a:t>‹#›</a:t>
+              <a:t>‹nº›</a:t>
             </a:fld>
             <a:endParaRPr lang="pt-BR"/>
           </a:p>
@@ -2485,7 +2485,7 @@
             <a:fld id="{0670EBBD-4B13-4AD7-AFB5-92105DCF1B3C}" type="datetimeFigureOut">
               <a:rPr lang="pt-BR" smtClean="0"/>
               <a:pPr/>
-              <a:t>22/07/2014</a:t>
+              <a:t>23/07/2014</a:t>
             </a:fld>
             <a:endParaRPr lang="pt-BR"/>
           </a:p>
@@ -2528,7 +2528,7 @@
             <a:fld id="{A860C3A5-2856-48FF-86AF-DABF9B624B89}" type="slidenum">
               <a:rPr lang="pt-BR" smtClean="0"/>
               <a:pPr/>
-              <a:t>‹#›</a:t>
+              <a:t>‹nº›</a:t>
             </a:fld>
             <a:endParaRPr lang="pt-BR"/>
           </a:p>
@@ -2548,7 +2548,7 @@
     <p:bg>
       <p:bgPr>
         <a:blipFill dpi="0" rotWithShape="1">
-          <a:blip r:embed="rId13">
+          <a:blip r:embed="rId13" cstate="print">
             <a:lum/>
           </a:blip>
           <a:srcRect/>
@@ -2704,7 +2704,7 @@
             <a:fld id="{0670EBBD-4B13-4AD7-AFB5-92105DCF1B3C}" type="datetimeFigureOut">
               <a:rPr lang="pt-BR" smtClean="0"/>
               <a:pPr/>
-              <a:t>22/07/2014</a:t>
+              <a:t>23/07/2014</a:t>
             </a:fld>
             <a:endParaRPr lang="pt-BR"/>
           </a:p>
@@ -2783,7 +2783,7 @@
             <a:fld id="{A860C3A5-2856-48FF-86AF-DABF9B624B89}" type="slidenum">
               <a:rPr lang="pt-BR" smtClean="0"/>
               <a:pPr/>
-              <a:t>‹#›</a:t>
+              <a:t>‹nº›</a:t>
             </a:fld>
             <a:endParaRPr lang="pt-BR"/>
           </a:p>
@@ -2801,7 +2801,7 @@
           <a:blip r:embed="rId14" cstate="print">
             <a:extLst>
               <a:ext uri="{28A0092B-C50C-407E-A947-70E740481C1C}">
-                <a14:useLocalDpi xmlns:a14="http://schemas.microsoft.com/office/drawing/2010/main" val="0"/>
+                <a14:useLocalDpi xmlns:a14="http://schemas.microsoft.com/office/drawing/2010/main" xmlns="" val="0"/>
               </a:ext>
             </a:extLst>
           </a:blip>
@@ -2821,7 +2821,7 @@
           <a:noFill/>
           <a:extLst>
             <a:ext uri="{909E8E84-426E-40DD-AFC4-6F175D3DCCD1}">
-              <a14:hiddenFill xmlns:a14="http://schemas.microsoft.com/office/drawing/2010/main">
+              <a14:hiddenFill xmlns:a14="http://schemas.microsoft.com/office/drawing/2010/main" xmlns="">
                 <a:solidFill>
                   <a:srgbClr val="FFFFFF"/>
                 </a:solidFill>
@@ -3302,6 +3302,9 @@
           <a:bodyPr/>
           <a:lstStyle/>
           <a:p>
+            <a:pPr>
+              <a:buNone/>
+            </a:pPr>
             <a:r>
               <a:rPr lang="pt-BR" dirty="0" smtClean="0">
                 <a:solidFill>
@@ -3309,10 +3312,8 @@
                 </a:solidFill>
                 <a:latin typeface="Blissful Thinking" panose="02000500000000000000" pitchFamily="2" charset="0"/>
               </a:rPr>
-              <a:t>Sistema de Atualização e Comunicação Interativo</a:t>
-            </a:r>
-          </a:p>
-          <a:p>
+              <a:t>    Sistema </a:t>
+            </a:r>
             <a:r>
               <a:rPr lang="pt-BR" dirty="0" smtClean="0">
                 <a:solidFill>
@@ -3320,10 +3321,13 @@
                 </a:solidFill>
                 <a:latin typeface="Blissful Thinking" panose="02000500000000000000" pitchFamily="2" charset="0"/>
               </a:rPr>
-              <a:t>Oferecer suporte às turmas</a:t>
-            </a:r>
-          </a:p>
-          <a:p>
+              <a:t>de Atualização e Comunicação Interativo</a:t>
+            </a:r>
+          </a:p>
+          <a:p>
+            <a:pPr>
+              <a:buNone/>
+            </a:pPr>
             <a:r>
               <a:rPr lang="pt-BR" dirty="0" smtClean="0">
                 <a:solidFill>
@@ -3331,10 +3335,8 @@
                 </a:solidFill>
                 <a:latin typeface="Blissful Thinking" panose="02000500000000000000" pitchFamily="2" charset="0"/>
               </a:rPr>
-              <a:t>Possibilitar a troca de informação e conteúdo entre os integrantes da turma de maneira organizada</a:t>
-            </a:r>
-          </a:p>
-          <a:p>
+              <a:t>    Oferecer </a:t>
+            </a:r>
             <a:r>
               <a:rPr lang="pt-BR" dirty="0" smtClean="0">
                 <a:solidFill>
@@ -3342,7 +3344,53 @@
                 </a:solidFill>
                 <a:latin typeface="Blissful Thinking" panose="02000500000000000000" pitchFamily="2" charset="0"/>
               </a:rPr>
-              <a:t>Promover interação professor-aluno</a:t>
+              <a:t>suporte às turmas</a:t>
+            </a:r>
+          </a:p>
+          <a:p>
+            <a:pPr>
+              <a:buNone/>
+            </a:pPr>
+            <a:r>
+              <a:rPr lang="pt-BR" dirty="0" smtClean="0">
+                <a:solidFill>
+                  <a:schemeClr val="bg1"/>
+                </a:solidFill>
+                <a:latin typeface="Blissful Thinking" panose="02000500000000000000" pitchFamily="2" charset="0"/>
+              </a:rPr>
+              <a:t>    Possibilitar </a:t>
+            </a:r>
+            <a:r>
+              <a:rPr lang="pt-BR" dirty="0" smtClean="0">
+                <a:solidFill>
+                  <a:schemeClr val="bg1"/>
+                </a:solidFill>
+                <a:latin typeface="Blissful Thinking" panose="02000500000000000000" pitchFamily="2" charset="0"/>
+              </a:rPr>
+              <a:t>a troca de informação e conteúdo entre os integrantes da turma de maneira organizada</a:t>
+            </a:r>
+          </a:p>
+          <a:p>
+            <a:pPr>
+              <a:buNone/>
+            </a:pPr>
+            <a:r>
+              <a:rPr lang="pt-BR" dirty="0" smtClean="0">
+                <a:solidFill>
+                  <a:schemeClr val="bg1"/>
+                </a:solidFill>
+                <a:latin typeface="Blissful Thinking" panose="02000500000000000000" pitchFamily="2" charset="0"/>
+              </a:rPr>
+              <a:t>    Promover </a:t>
+            </a:r>
+            <a:r>
+              <a:rPr lang="pt-BR" dirty="0" smtClean="0">
+                <a:solidFill>
+                  <a:schemeClr val="bg1"/>
+                </a:solidFill>
+                <a:latin typeface="Blissful Thinking" panose="02000500000000000000" pitchFamily="2" charset="0"/>
+              </a:rPr>
+              <a:t>interação professor-aluno</a:t>
             </a:r>
           </a:p>
           <a:p>
@@ -3362,7 +3410,7 @@
           <a:blip r:embed="rId2" cstate="print">
             <a:extLst>
               <a:ext uri="{28A0092B-C50C-407E-A947-70E740481C1C}">
-                <a14:useLocalDpi xmlns:a14="http://schemas.microsoft.com/office/drawing/2010/main" val="0"/>
+                <a14:useLocalDpi xmlns:a14="http://schemas.microsoft.com/office/drawing/2010/main" xmlns="" val="0"/>
               </a:ext>
             </a:extLst>
           </a:blip>
@@ -3382,7 +3430,7 @@
           <a:noFill/>
           <a:extLst>
             <a:ext uri="{909E8E84-426E-40DD-AFC4-6F175D3DCCD1}">
-              <a14:hiddenFill xmlns:a14="http://schemas.microsoft.com/office/drawing/2010/main">
+              <a14:hiddenFill xmlns:a14="http://schemas.microsoft.com/office/drawing/2010/main" xmlns="">
                 <a:solidFill>
                   <a:srgbClr val="FFFFFF"/>
                 </a:solidFill>
@@ -3403,7 +3451,7 @@
           <a:blip r:embed="rId2" cstate="print">
             <a:extLst>
               <a:ext uri="{28A0092B-C50C-407E-A947-70E740481C1C}">
-                <a14:useLocalDpi xmlns:a14="http://schemas.microsoft.com/office/drawing/2010/main" val="0"/>
+                <a14:useLocalDpi xmlns:a14="http://schemas.microsoft.com/office/drawing/2010/main" xmlns="" val="0"/>
               </a:ext>
             </a:extLst>
           </a:blip>
@@ -3423,7 +3471,7 @@
           <a:noFill/>
           <a:extLst>
             <a:ext uri="{909E8E84-426E-40DD-AFC4-6F175D3DCCD1}">
-              <a14:hiddenFill xmlns:a14="http://schemas.microsoft.com/office/drawing/2010/main">
+              <a14:hiddenFill xmlns:a14="http://schemas.microsoft.com/office/drawing/2010/main" xmlns="">
                 <a:solidFill>
                   <a:srgbClr val="FFFFFF"/>
                 </a:solidFill>
@@ -3444,7 +3492,7 @@
           <a:blip r:embed="rId2" cstate="print">
             <a:extLst>
               <a:ext uri="{28A0092B-C50C-407E-A947-70E740481C1C}">
-                <a14:useLocalDpi xmlns:a14="http://schemas.microsoft.com/office/drawing/2010/main" val="0"/>
+                <a14:useLocalDpi xmlns:a14="http://schemas.microsoft.com/office/drawing/2010/main" xmlns="" val="0"/>
               </a:ext>
             </a:extLst>
           </a:blip>
@@ -3464,7 +3512,7 @@
           <a:noFill/>
           <a:extLst>
             <a:ext uri="{909E8E84-426E-40DD-AFC4-6F175D3DCCD1}">
-              <a14:hiddenFill xmlns:a14="http://schemas.microsoft.com/office/drawing/2010/main">
+              <a14:hiddenFill xmlns:a14="http://schemas.microsoft.com/office/drawing/2010/main" xmlns="">
                 <a:solidFill>
                   <a:srgbClr val="FFFFFF"/>
                 </a:solidFill>
@@ -3485,7 +3533,7 @@
           <a:blip r:embed="rId2" cstate="print">
             <a:extLst>
               <a:ext uri="{28A0092B-C50C-407E-A947-70E740481C1C}">
-                <a14:useLocalDpi xmlns:a14="http://schemas.microsoft.com/office/drawing/2010/main" val="0"/>
+                <a14:useLocalDpi xmlns:a14="http://schemas.microsoft.com/office/drawing/2010/main" xmlns="" val="0"/>
               </a:ext>
             </a:extLst>
           </a:blip>
@@ -3505,7 +3553,7 @@
           <a:noFill/>
           <a:extLst>
             <a:ext uri="{909E8E84-426E-40DD-AFC4-6F175D3DCCD1}">
-              <a14:hiddenFill xmlns:a14="http://schemas.microsoft.com/office/drawing/2010/main">
+              <a14:hiddenFill xmlns:a14="http://schemas.microsoft.com/office/drawing/2010/main" xmlns="">
                 <a:solidFill>
                   <a:srgbClr val="FFFFFF"/>
                 </a:solidFill>
@@ -3605,6 +3653,9 @@
           </a:bodyPr>
           <a:lstStyle/>
           <a:p>
+            <a:pPr>
+              <a:buNone/>
+            </a:pPr>
             <a:r>
               <a:rPr lang="pt-BR" dirty="0" smtClean="0">
                 <a:solidFill>
@@ -3612,10 +3663,8 @@
                 </a:solidFill>
                 <a:latin typeface="Blissful Thinking" panose="02000500000000000000" pitchFamily="2" charset="0"/>
               </a:rPr>
-              <a:t>Arquivos desorganizados</a:t>
-            </a:r>
-          </a:p>
-          <a:p>
+              <a:t>    Arquivos </a:t>
+            </a:r>
             <a:r>
               <a:rPr lang="pt-BR" dirty="0" smtClean="0">
                 <a:solidFill>
@@ -3623,7 +3672,30 @@
                 </a:solidFill>
                 <a:latin typeface="Blissful Thinking" panose="02000500000000000000" pitchFamily="2" charset="0"/>
               </a:rPr>
-              <a:t>Difícil procura de um </a:t>
+              <a:t>desorganizados</a:t>
+            </a:r>
+          </a:p>
+          <a:p>
+            <a:pPr>
+              <a:buNone/>
+            </a:pPr>
+            <a:r>
+              <a:rPr lang="pt-BR" dirty="0" smtClean="0">
+                <a:solidFill>
+                  <a:schemeClr val="bg1"/>
+                </a:solidFill>
+                <a:latin typeface="Blissful Thinking" panose="02000500000000000000" pitchFamily="2" charset="0"/>
+              </a:rPr>
+              <a:t>    Difícil </a:t>
+            </a:r>
+            <a:r>
+              <a:rPr lang="pt-BR" dirty="0" smtClean="0">
+                <a:solidFill>
+                  <a:schemeClr val="bg1"/>
+                </a:solidFill>
+                <a:latin typeface="Blissful Thinking" panose="02000500000000000000" pitchFamily="2" charset="0"/>
+              </a:rPr>
+              <a:t>procura de um </a:t>
             </a:r>
             <a:r>
               <a:rPr lang="pt-BR" dirty="0" err="1" smtClean="0">
@@ -3645,6 +3717,9 @@
             </a:r>
           </a:p>
           <a:p>
+            <a:pPr>
+              <a:buNone/>
+            </a:pPr>
             <a:r>
               <a:rPr lang="pt-BR" dirty="0" smtClean="0">
                 <a:solidFill>
@@ -3652,10 +3727,8 @@
                 </a:solidFill>
                 <a:latin typeface="Blissful Thinking" panose="02000500000000000000" pitchFamily="2" charset="0"/>
               </a:rPr>
-              <a:t>Não é focado somente na escola</a:t>
-            </a:r>
-          </a:p>
-          <a:p>
+              <a:t>    Não </a:t>
+            </a:r>
             <a:r>
               <a:rPr lang="pt-BR" dirty="0" smtClean="0">
                 <a:solidFill>
@@ -3663,7 +3736,30 @@
                 </a:solidFill>
                 <a:latin typeface="Blissful Thinking" panose="02000500000000000000" pitchFamily="2" charset="0"/>
               </a:rPr>
-              <a:t>Não possui a interação com o professor</a:t>
+              <a:t>é focado somente na escola</a:t>
+            </a:r>
+          </a:p>
+          <a:p>
+            <a:pPr>
+              <a:buNone/>
+            </a:pPr>
+            <a:r>
+              <a:rPr lang="pt-BR" dirty="0" smtClean="0">
+                <a:solidFill>
+                  <a:schemeClr val="bg1"/>
+                </a:solidFill>
+                <a:latin typeface="Blissful Thinking" panose="02000500000000000000" pitchFamily="2" charset="0"/>
+              </a:rPr>
+              <a:t>    Não </a:t>
+            </a:r>
+            <a:r>
+              <a:rPr lang="pt-BR" dirty="0" smtClean="0">
+                <a:solidFill>
+                  <a:schemeClr val="bg1"/>
+                </a:solidFill>
+                <a:latin typeface="Blissful Thinking" panose="02000500000000000000" pitchFamily="2" charset="0"/>
+              </a:rPr>
+              <a:t>possui a interação com o professor</a:t>
             </a:r>
             <a:endParaRPr lang="pt-BR" dirty="0">
               <a:solidFill>
@@ -3712,7 +3808,7 @@
           <a:blip r:embed="rId3" cstate="print">
             <a:extLst>
               <a:ext uri="{28A0092B-C50C-407E-A947-70E740481C1C}">
-                <a14:useLocalDpi xmlns:a14="http://schemas.microsoft.com/office/drawing/2010/main" val="0"/>
+                <a14:useLocalDpi xmlns:a14="http://schemas.microsoft.com/office/drawing/2010/main" xmlns="" val="0"/>
               </a:ext>
             </a:extLst>
           </a:blip>
@@ -3732,7 +3828,7 @@
           <a:noFill/>
           <a:extLst>
             <a:ext uri="{909E8E84-426E-40DD-AFC4-6F175D3DCCD1}">
-              <a14:hiddenFill xmlns:a14="http://schemas.microsoft.com/office/drawing/2010/main">
+              <a14:hiddenFill xmlns:a14="http://schemas.microsoft.com/office/drawing/2010/main" xmlns="">
                 <a:solidFill>
                   <a:srgbClr val="FFFFFF"/>
                 </a:solidFill>
@@ -3753,7 +3849,7 @@
           <a:blip r:embed="rId3" cstate="print">
             <a:extLst>
               <a:ext uri="{28A0092B-C50C-407E-A947-70E740481C1C}">
-                <a14:useLocalDpi xmlns:a14="http://schemas.microsoft.com/office/drawing/2010/main" val="0"/>
+                <a14:useLocalDpi xmlns:a14="http://schemas.microsoft.com/office/drawing/2010/main" xmlns="" val="0"/>
               </a:ext>
             </a:extLst>
           </a:blip>
@@ -3773,7 +3869,7 @@
           <a:noFill/>
           <a:extLst>
             <a:ext uri="{909E8E84-426E-40DD-AFC4-6F175D3DCCD1}">
-              <a14:hiddenFill xmlns:a14="http://schemas.microsoft.com/office/drawing/2010/main">
+              <a14:hiddenFill xmlns:a14="http://schemas.microsoft.com/office/drawing/2010/main" xmlns="">
                 <a:solidFill>
                   <a:srgbClr val="FFFFFF"/>
                 </a:solidFill>
@@ -3794,7 +3890,7 @@
           <a:blip r:embed="rId3" cstate="print">
             <a:extLst>
               <a:ext uri="{28A0092B-C50C-407E-A947-70E740481C1C}">
-                <a14:useLocalDpi xmlns:a14="http://schemas.microsoft.com/office/drawing/2010/main" val="0"/>
+                <a14:useLocalDpi xmlns:a14="http://schemas.microsoft.com/office/drawing/2010/main" xmlns="" val="0"/>
               </a:ext>
             </a:extLst>
           </a:blip>
@@ -3814,7 +3910,7 @@
           <a:noFill/>
           <a:extLst>
             <a:ext uri="{909E8E84-426E-40DD-AFC4-6F175D3DCCD1}">
-              <a14:hiddenFill xmlns:a14="http://schemas.microsoft.com/office/drawing/2010/main">
+              <a14:hiddenFill xmlns:a14="http://schemas.microsoft.com/office/drawing/2010/main" xmlns="">
                 <a:solidFill>
                   <a:srgbClr val="FFFFFF"/>
                 </a:solidFill>
@@ -3835,7 +3931,7 @@
           <a:blip r:embed="rId3" cstate="print">
             <a:extLst>
               <a:ext uri="{28A0092B-C50C-407E-A947-70E740481C1C}">
-                <a14:useLocalDpi xmlns:a14="http://schemas.microsoft.com/office/drawing/2010/main" val="0"/>
+                <a14:useLocalDpi xmlns:a14="http://schemas.microsoft.com/office/drawing/2010/main" xmlns="" val="0"/>
               </a:ext>
             </a:extLst>
           </a:blip>
@@ -3855,7 +3951,7 @@
           <a:noFill/>
           <a:extLst>
             <a:ext uri="{909E8E84-426E-40DD-AFC4-6F175D3DCCD1}">
-              <a14:hiddenFill xmlns:a14="http://schemas.microsoft.com/office/drawing/2010/main">
+              <a14:hiddenFill xmlns:a14="http://schemas.microsoft.com/office/drawing/2010/main" xmlns="">
                 <a:solidFill>
                   <a:srgbClr val="FFFFFF"/>
                 </a:solidFill>
@@ -3948,6 +4044,9 @@
           <a:bodyPr/>
           <a:lstStyle/>
           <a:p>
+            <a:pPr>
+              <a:buNone/>
+            </a:pPr>
             <a:r>
               <a:rPr lang="pt-BR" dirty="0" smtClean="0">
                 <a:solidFill>
@@ -3955,11 +4054,58 @@
                 </a:solidFill>
                 <a:latin typeface="Blissful Thinking" panose="02000500000000000000" pitchFamily="2" charset="0"/>
               </a:rPr>
-              <a:t>Calendário da turma com informações de:</a:t>
-            </a:r>
-          </a:p>
-          <a:p>
-            <a:pPr lvl="1"/>
+              <a:t> </a:t>
+            </a:r>
+            <a:r>
+              <a:rPr lang="pt-BR" dirty="0" smtClean="0">
+                <a:solidFill>
+                  <a:schemeClr val="bg1"/>
+                </a:solidFill>
+                <a:latin typeface="Blissful Thinking" panose="02000500000000000000" pitchFamily="2" charset="0"/>
+              </a:rPr>
+              <a:t>   </a:t>
+            </a:r>
+            <a:r>
+              <a:rPr lang="pt-BR" dirty="0" smtClean="0">
+                <a:solidFill>
+                  <a:schemeClr val="bg1"/>
+                </a:solidFill>
+                <a:latin typeface="Blissful Thinking" panose="02000500000000000000" pitchFamily="2" charset="0"/>
+              </a:rPr>
+              <a:t>Calendário </a:t>
+            </a:r>
+            <a:r>
+              <a:rPr lang="pt-BR" dirty="0" smtClean="0">
+                <a:solidFill>
+                  <a:schemeClr val="bg1"/>
+                </a:solidFill>
+                <a:latin typeface="Blissful Thinking" panose="02000500000000000000" pitchFamily="2" charset="0"/>
+              </a:rPr>
+              <a:t>da turma com informações de:</a:t>
+            </a:r>
+          </a:p>
+          <a:p>
+            <a:pPr lvl="1">
+              <a:buNone/>
+            </a:pPr>
+            <a:r>
+              <a:rPr lang="pt-BR" dirty="0" smtClean="0">
+                <a:solidFill>
+                  <a:schemeClr val="bg1"/>
+                </a:solidFill>
+                <a:latin typeface="Blissful Thinking" panose="02000500000000000000" pitchFamily="2" charset="0"/>
+              </a:rPr>
+              <a:t> </a:t>
+            </a:r>
+            <a:r>
+              <a:rPr lang="pt-BR" dirty="0" smtClean="0">
+                <a:solidFill>
+                  <a:schemeClr val="bg1"/>
+                </a:solidFill>
+                <a:latin typeface="Blissful Thinking" panose="02000500000000000000" pitchFamily="2" charset="0"/>
+              </a:rPr>
+              <a:t>   </a:t>
+            </a:r>
             <a:r>
               <a:rPr lang="pt-BR" dirty="0" smtClean="0">
                 <a:solidFill>
@@ -3969,9 +4115,17 @@
               </a:rPr>
               <a:t>Trabalhos</a:t>
             </a:r>
-          </a:p>
-          <a:p>
-            <a:pPr lvl="1"/>
+            <a:endParaRPr lang="pt-BR" dirty="0" smtClean="0">
+              <a:solidFill>
+                <a:schemeClr val="bg1"/>
+              </a:solidFill>
+              <a:latin typeface="Blissful Thinking" panose="02000500000000000000" pitchFamily="2" charset="0"/>
+            </a:endParaRPr>
+          </a:p>
+          <a:p>
+            <a:pPr lvl="1">
+              <a:buNone/>
+            </a:pPr>
             <a:r>
               <a:rPr lang="pt-BR" dirty="0" smtClean="0">
                 <a:solidFill>
@@ -3979,10 +4133,8 @@
                 </a:solidFill>
                 <a:latin typeface="Blissful Thinking" panose="02000500000000000000" pitchFamily="2" charset="0"/>
               </a:rPr>
-              <a:t>Testes e provas</a:t>
-            </a:r>
-          </a:p>
-          <a:p>
+              <a:t> </a:t>
+            </a:r>
             <a:r>
               <a:rPr lang="pt-BR" dirty="0" smtClean="0">
                 <a:solidFill>
@@ -3990,11 +4142,8 @@
                 </a:solidFill>
                 <a:latin typeface="Blissful Thinking" panose="02000500000000000000" pitchFamily="2" charset="0"/>
               </a:rPr>
-              <a:t>Divisão por matéria e por:</a:t>
-            </a:r>
-          </a:p>
-          <a:p>
-            <a:pPr lvl="1"/>
+              <a:t>   </a:t>
+            </a:r>
             <a:r>
               <a:rPr lang="pt-BR" dirty="0" smtClean="0">
                 <a:solidFill>
@@ -4002,11 +4151,8 @@
                 </a:solidFill>
                 <a:latin typeface="Blissful Thinking" panose="02000500000000000000" pitchFamily="2" charset="0"/>
               </a:rPr>
-              <a:t>Arquivos</a:t>
-            </a:r>
-          </a:p>
-          <a:p>
-            <a:pPr lvl="1"/>
+              <a:t>Testes </a:t>
+            </a:r>
             <a:r>
               <a:rPr lang="pt-BR" dirty="0" smtClean="0">
                 <a:solidFill>
@@ -4014,11 +4160,88 @@
                 </a:solidFill>
                 <a:latin typeface="Blissful Thinking" panose="02000500000000000000" pitchFamily="2" charset="0"/>
               </a:rPr>
-              <a:t>Fotos	</a:t>
-            </a:r>
-          </a:p>
-          <a:p>
-            <a:pPr lvl="1"/>
+              <a:t>e provas</a:t>
+            </a:r>
+          </a:p>
+          <a:p>
+            <a:pPr>
+              <a:buNone/>
+            </a:pPr>
+            <a:r>
+              <a:rPr lang="pt-BR" dirty="0" smtClean="0">
+                <a:solidFill>
+                  <a:schemeClr val="bg1"/>
+                </a:solidFill>
+                <a:latin typeface="Blissful Thinking" panose="02000500000000000000" pitchFamily="2" charset="0"/>
+              </a:rPr>
+              <a:t>    Divisão </a:t>
+            </a:r>
+            <a:r>
+              <a:rPr lang="pt-BR" dirty="0" smtClean="0">
+                <a:solidFill>
+                  <a:schemeClr val="bg1"/>
+                </a:solidFill>
+                <a:latin typeface="Blissful Thinking" panose="02000500000000000000" pitchFamily="2" charset="0"/>
+              </a:rPr>
+              <a:t>por matéria e por:</a:t>
+            </a:r>
+          </a:p>
+          <a:p>
+            <a:pPr lvl="1">
+              <a:buNone/>
+            </a:pPr>
+            <a:r>
+              <a:rPr lang="pt-BR" dirty="0" smtClean="0">
+                <a:solidFill>
+                  <a:schemeClr val="bg1"/>
+                </a:solidFill>
+                <a:latin typeface="Blissful Thinking" panose="02000500000000000000" pitchFamily="2" charset="0"/>
+              </a:rPr>
+              <a:t>    Arquivos</a:t>
+            </a:r>
+            <a:endParaRPr lang="pt-BR" dirty="0" smtClean="0">
+              <a:solidFill>
+                <a:schemeClr val="bg1"/>
+              </a:solidFill>
+              <a:latin typeface="Blissful Thinking" panose="02000500000000000000" pitchFamily="2" charset="0"/>
+            </a:endParaRPr>
+          </a:p>
+          <a:p>
+            <a:pPr lvl="1">
+              <a:buNone/>
+            </a:pPr>
+            <a:r>
+              <a:rPr lang="pt-BR" dirty="0" smtClean="0">
+                <a:solidFill>
+                  <a:schemeClr val="bg1"/>
+                </a:solidFill>
+                <a:latin typeface="Blissful Thinking" panose="02000500000000000000" pitchFamily="2" charset="0"/>
+              </a:rPr>
+              <a:t>    Fotos</a:t>
+            </a:r>
+            <a:r>
+              <a:rPr lang="pt-BR" dirty="0" smtClean="0">
+                <a:solidFill>
+                  <a:schemeClr val="bg1"/>
+                </a:solidFill>
+                <a:latin typeface="Blissful Thinking" panose="02000500000000000000" pitchFamily="2" charset="0"/>
+              </a:rPr>
+              <a:t>	</a:t>
+            </a:r>
+          </a:p>
+          <a:p>
+            <a:pPr lvl="1">
+              <a:buNone/>
+            </a:pPr>
+            <a:r>
+              <a:rPr lang="pt-BR" dirty="0" smtClean="0">
+                <a:solidFill>
+                  <a:schemeClr val="bg1"/>
+                </a:solidFill>
+                <a:latin typeface="Blissful Thinking" panose="02000500000000000000" pitchFamily="2" charset="0"/>
+              </a:rPr>
+              <a:t>    </a:t>
+            </a:r>
             <a:r>
               <a:rPr lang="pt-BR" dirty="0" err="1" smtClean="0">
                 <a:solidFill>
@@ -4055,7 +4278,7 @@
           <a:blip r:embed="rId2" cstate="print">
             <a:extLst>
               <a:ext uri="{28A0092B-C50C-407E-A947-70E740481C1C}">
-                <a14:useLocalDpi xmlns:a14="http://schemas.microsoft.com/office/drawing/2010/main" val="0"/>
+                <a14:useLocalDpi xmlns:a14="http://schemas.microsoft.com/office/drawing/2010/main" xmlns="" val="0"/>
               </a:ext>
             </a:extLst>
           </a:blip>
@@ -4075,7 +4298,7 @@
           <a:noFill/>
           <a:extLst>
             <a:ext uri="{909E8E84-426E-40DD-AFC4-6F175D3DCCD1}">
-              <a14:hiddenFill xmlns:a14="http://schemas.microsoft.com/office/drawing/2010/main">
+              <a14:hiddenFill xmlns:a14="http://schemas.microsoft.com/office/drawing/2010/main" xmlns="">
                 <a:solidFill>
                   <a:srgbClr val="FFFFFF"/>
                 </a:solidFill>
@@ -4096,7 +4319,7 @@
           <a:blip r:embed="rId2" cstate="print">
             <a:extLst>
               <a:ext uri="{28A0092B-C50C-407E-A947-70E740481C1C}">
-                <a14:useLocalDpi xmlns:a14="http://schemas.microsoft.com/office/drawing/2010/main" val="0"/>
+                <a14:useLocalDpi xmlns:a14="http://schemas.microsoft.com/office/drawing/2010/main" xmlns="" val="0"/>
               </a:ext>
             </a:extLst>
           </a:blip>
@@ -4116,7 +4339,7 @@
           <a:noFill/>
           <a:extLst>
             <a:ext uri="{909E8E84-426E-40DD-AFC4-6F175D3DCCD1}">
-              <a14:hiddenFill xmlns:a14="http://schemas.microsoft.com/office/drawing/2010/main">
+              <a14:hiddenFill xmlns:a14="http://schemas.microsoft.com/office/drawing/2010/main" xmlns="">
                 <a:solidFill>
                   <a:srgbClr val="FFFFFF"/>
                 </a:solidFill>
@@ -4144,7 +4367,7 @@
             </a:duotone>
             <a:extLst>
               <a:ext uri="{28A0092B-C50C-407E-A947-70E740481C1C}">
-                <a14:useLocalDpi xmlns:a14="http://schemas.microsoft.com/office/drawing/2010/main" val="0"/>
+                <a14:useLocalDpi xmlns:a14="http://schemas.microsoft.com/office/drawing/2010/main" xmlns="" val="0"/>
               </a:ext>
             </a:extLst>
           </a:blip>
@@ -4164,7 +4387,7 @@
           <a:noFill/>
           <a:extLst>
             <a:ext uri="{909E8E84-426E-40DD-AFC4-6F175D3DCCD1}">
-              <a14:hiddenFill xmlns:a14="http://schemas.microsoft.com/office/drawing/2010/main">
+              <a14:hiddenFill xmlns:a14="http://schemas.microsoft.com/office/drawing/2010/main" xmlns="">
                 <a:solidFill>
                   <a:srgbClr val="FFFFFF"/>
                 </a:solidFill>
@@ -4192,7 +4415,7 @@
             </a:duotone>
             <a:extLst>
               <a:ext uri="{28A0092B-C50C-407E-A947-70E740481C1C}">
-                <a14:useLocalDpi xmlns:a14="http://schemas.microsoft.com/office/drawing/2010/main" val="0"/>
+                <a14:useLocalDpi xmlns:a14="http://schemas.microsoft.com/office/drawing/2010/main" xmlns="" val="0"/>
               </a:ext>
             </a:extLst>
           </a:blip>
@@ -4212,7 +4435,7 @@
           <a:noFill/>
           <a:extLst>
             <a:ext uri="{909E8E84-426E-40DD-AFC4-6F175D3DCCD1}">
-              <a14:hiddenFill xmlns:a14="http://schemas.microsoft.com/office/drawing/2010/main">
+              <a14:hiddenFill xmlns:a14="http://schemas.microsoft.com/office/drawing/2010/main" xmlns="">
                 <a:solidFill>
                   <a:srgbClr val="FFFFFF"/>
                 </a:solidFill>
@@ -4240,7 +4463,7 @@
             </a:duotone>
             <a:extLst>
               <a:ext uri="{28A0092B-C50C-407E-A947-70E740481C1C}">
-                <a14:useLocalDpi xmlns:a14="http://schemas.microsoft.com/office/drawing/2010/main" val="0"/>
+                <a14:useLocalDpi xmlns:a14="http://schemas.microsoft.com/office/drawing/2010/main" xmlns="" val="0"/>
               </a:ext>
             </a:extLst>
           </a:blip>
@@ -4260,7 +4483,7 @@
           <a:noFill/>
           <a:extLst>
             <a:ext uri="{909E8E84-426E-40DD-AFC4-6F175D3DCCD1}">
-              <a14:hiddenFill xmlns:a14="http://schemas.microsoft.com/office/drawing/2010/main">
+              <a14:hiddenFill xmlns:a14="http://schemas.microsoft.com/office/drawing/2010/main" xmlns="">
                 <a:solidFill>
                   <a:srgbClr val="FFFFFF"/>
                 </a:solidFill>
@@ -4288,7 +4511,7 @@
             </a:duotone>
             <a:extLst>
               <a:ext uri="{28A0092B-C50C-407E-A947-70E740481C1C}">
-                <a14:useLocalDpi xmlns:a14="http://schemas.microsoft.com/office/drawing/2010/main" val="0"/>
+                <a14:useLocalDpi xmlns:a14="http://schemas.microsoft.com/office/drawing/2010/main" xmlns="" val="0"/>
               </a:ext>
             </a:extLst>
           </a:blip>
@@ -4308,7 +4531,7 @@
           <a:noFill/>
           <a:extLst>
             <a:ext uri="{909E8E84-426E-40DD-AFC4-6F175D3DCCD1}">
-              <a14:hiddenFill xmlns:a14="http://schemas.microsoft.com/office/drawing/2010/main">
+              <a14:hiddenFill xmlns:a14="http://schemas.microsoft.com/office/drawing/2010/main" xmlns="">
                 <a:solidFill>
                   <a:srgbClr val="FFFFFF"/>
                 </a:solidFill>
@@ -4336,7 +4559,7 @@
             </a:duotone>
             <a:extLst>
               <a:ext uri="{28A0092B-C50C-407E-A947-70E740481C1C}">
-                <a14:useLocalDpi xmlns:a14="http://schemas.microsoft.com/office/drawing/2010/main" val="0"/>
+                <a14:useLocalDpi xmlns:a14="http://schemas.microsoft.com/office/drawing/2010/main" xmlns="" val="0"/>
               </a:ext>
             </a:extLst>
           </a:blip>
@@ -4356,7 +4579,7 @@
           <a:noFill/>
           <a:extLst>
             <a:ext uri="{909E8E84-426E-40DD-AFC4-6F175D3DCCD1}">
-              <a14:hiddenFill xmlns:a14="http://schemas.microsoft.com/office/drawing/2010/main">
+              <a14:hiddenFill xmlns:a14="http://schemas.microsoft.com/office/drawing/2010/main" xmlns="">
                 <a:solidFill>
                   <a:srgbClr val="FFFFFF"/>
                 </a:solidFill>
@@ -4700,34 +4923,8 @@
         </p:blipFill>
         <p:spPr bwMode="auto">
           <a:xfrm>
-            <a:off x="107504" y="908720"/>
+            <a:off x="2051720" y="1916832"/>
             <a:ext cx="4968552" cy="2511628"/>
-          </a:xfrm>
-          <a:prstGeom prst="rect">
-            <a:avLst/>
-          </a:prstGeom>
-          <a:noFill/>
-        </p:spPr>
-      </p:pic>
-      <p:pic>
-        <p:nvPicPr>
-          <p:cNvPr id="6" name="Picture 2" descr="C:\Users\Usuário\Dropbox\_ORT\PR\SACI\usuarios.png"/>
-          <p:cNvPicPr>
-            <a:picLocks noChangeAspect="1" noChangeArrowheads="1"/>
-          </p:cNvPicPr>
-          <p:nvPr/>
-        </p:nvPicPr>
-        <p:blipFill>
-          <a:blip r:embed="rId3" cstate="print"/>
-          <a:srcRect/>
-          <a:stretch>
-            <a:fillRect/>
-          </a:stretch>
-        </p:blipFill>
-        <p:spPr bwMode="auto">
-          <a:xfrm>
-            <a:off x="3059832" y="2364438"/>
-            <a:ext cx="5126132" cy="2591287"/>
           </a:xfrm>
           <a:prstGeom prst="rect">
             <a:avLst/>

</xml_diff>